<commit_message>
Little changes made (making NodeJS as backend)
</commit_message>
<xml_diff>
--- a/Project proposal.pptx
+++ b/Project proposal.pptx
@@ -8079,7 +8079,7 @@
                 </a:solidFill>
                 <a:latin typeface="Corbel"/>
               </a:rPr>
-              <a:t>HTML5, CSS3, JAVASCRIPT, React, Node</a:t>
+              <a:t>HTML5, CSS3, JAVASCRIPT, React</a:t>
             </a:r>
           </a:p>
           <a:p>
@@ -8114,7 +8114,17 @@
                 <a:latin typeface="Corbel"/>
                 <a:sym typeface="Wingdings" panose="05000000000000000000" pitchFamily="2" charset="2"/>
               </a:rPr>
-              <a:t> API’s</a:t>
+              <a:t> </a:t>
+            </a:r>
+            <a:r>
+              <a:rPr lang="en-US" sz="2400" spc="-1">
+                <a:solidFill>
+                  <a:srgbClr val="000000"/>
+                </a:solidFill>
+                <a:latin typeface="Corbel"/>
+                <a:sym typeface="Wingdings" panose="05000000000000000000" pitchFamily="2" charset="2"/>
+              </a:rPr>
+              <a:t>NodeJS, API’s</a:t>
             </a:r>
             <a:endParaRPr lang="en-US" sz="2400" b="0" strike="noStrike" spc="-1" dirty="0">
               <a:solidFill>

</xml_diff>